<commit_message>
Finished presentation, tested code snippets and fixed typos
</commit_message>
<xml_diff>
--- a/spatial_data_production.pptx
+++ b/spatial_data_production.pptx
@@ -115,6 +115,11 @@
       </a:defRPr>
     </a:lvl9pPr>
   </p:defaultTextStyle>
+  <p:extLst>
+    <p:ext uri="{EFAFB233-063F-42B5-8137-9DF3F51BA10A}">
+      <p15:sldGuideLst xmlns:p15="http://schemas.microsoft.com/office/powerpoint/2012/main"/>
+    </p:ext>
+  </p:extLst>
 </p:presentation>
 </file>
 
@@ -286,7 +291,7 @@
           <a:p>
             <a:fld id="{4AAD347D-5ACD-4C99-B74B-A9C85AD731AF}" type="datetimeFigureOut">
               <a:rPr lang="en-US" smtClean="0"/>
-              <a:t>5/25/15</a:t>
+              <a:t>5/27/15</a:t>
             </a:fld>
             <a:endParaRPr lang="en-US" dirty="0"/>
           </a:p>
@@ -519,7 +524,7 @@
           <a:p>
             <a:fld id="{4509A250-FF31-4206-8172-F9D3106AACB1}" type="datetimeFigureOut">
               <a:rPr lang="en-US" smtClean="0"/>
-              <a:t>5/25/15</a:t>
+              <a:t>5/27/15</a:t>
             </a:fld>
             <a:endParaRPr lang="en-US" dirty="0"/>
           </a:p>
@@ -699,7 +704,7 @@
           <a:p>
             <a:fld id="{4509A250-FF31-4206-8172-F9D3106AACB1}" type="datetimeFigureOut">
               <a:rPr lang="en-US" smtClean="0"/>
-              <a:t>5/25/15</a:t>
+              <a:t>5/27/15</a:t>
             </a:fld>
             <a:endParaRPr lang="en-US" dirty="0"/>
           </a:p>
@@ -874,7 +879,7 @@
           <a:p>
             <a:fld id="{4509A250-FF31-4206-8172-F9D3106AACB1}" type="datetimeFigureOut">
               <a:rPr lang="en-US" smtClean="0"/>
-              <a:t>5/25/15</a:t>
+              <a:t>5/27/15</a:t>
             </a:fld>
             <a:endParaRPr lang="en-US" dirty="0"/>
           </a:p>
@@ -1128,7 +1133,7 @@
           <a:p>
             <a:fld id="{9796027F-7875-4030-9381-8BD8C4F21935}" type="datetimeFigureOut">
               <a:rPr lang="en-US" smtClean="0"/>
-              <a:t>5/25/15</a:t>
+              <a:t>5/27/15</a:t>
             </a:fld>
             <a:endParaRPr lang="en-US" dirty="0"/>
           </a:p>
@@ -1459,7 +1464,7 @@
           <a:p>
             <a:fld id="{9796027F-7875-4030-9381-8BD8C4F21935}" type="datetimeFigureOut">
               <a:rPr lang="en-US" smtClean="0"/>
-              <a:t>5/25/15</a:t>
+              <a:t>5/27/15</a:t>
             </a:fld>
             <a:endParaRPr lang="en-US" dirty="0"/>
           </a:p>
@@ -1915,7 +1920,7 @@
           <a:p>
             <a:fld id="{9796027F-7875-4030-9381-8BD8C4F21935}" type="datetimeFigureOut">
               <a:rPr lang="en-US" smtClean="0"/>
-              <a:t>5/25/15</a:t>
+              <a:t>5/27/15</a:t>
             </a:fld>
             <a:endParaRPr lang="en-US" dirty="0"/>
           </a:p>
@@ -2038,7 +2043,7 @@
           <a:p>
             <a:fld id="{4509A250-FF31-4206-8172-F9D3106AACB1}" type="datetimeFigureOut">
               <a:rPr lang="en-US" smtClean="0"/>
-              <a:t>5/25/15</a:t>
+              <a:t>5/27/15</a:t>
             </a:fld>
             <a:endParaRPr lang="en-US" dirty="0"/>
           </a:p>
@@ -2133,7 +2138,7 @@
           <a:p>
             <a:fld id="{4509A250-FF31-4206-8172-F9D3106AACB1}" type="datetimeFigureOut">
               <a:rPr lang="en-US" smtClean="0"/>
-              <a:t>5/25/15</a:t>
+              <a:t>5/27/15</a:t>
             </a:fld>
             <a:endParaRPr lang="en-US" dirty="0"/>
           </a:p>
@@ -2425,7 +2430,7 @@
           <a:p>
             <a:fld id="{4509A250-FF31-4206-8172-F9D3106AACB1}" type="datetimeFigureOut">
               <a:rPr lang="en-US" smtClean="0"/>
-              <a:t>5/25/15</a:t>
+              <a:t>5/27/15</a:t>
             </a:fld>
             <a:endParaRPr lang="en-US" dirty="0"/>
           </a:p>
@@ -2755,7 +2760,7 @@
           <a:p>
             <a:fld id="{4509A250-FF31-4206-8172-F9D3106AACB1}" type="datetimeFigureOut">
               <a:rPr lang="en-US" smtClean="0"/>
-              <a:t>5/25/15</a:t>
+              <a:t>5/27/15</a:t>
             </a:fld>
             <a:endParaRPr lang="en-US" dirty="0"/>
           </a:p>
@@ -3009,7 +3014,7 @@
           <a:p>
             <a:fld id="{4AAD347D-5ACD-4C99-B74B-A9C85AD731AF}" type="datetimeFigureOut">
               <a:rPr lang="en-US" smtClean="0"/>
-              <a:t>5/25/15</a:t>
+              <a:t>5/27/15</a:t>
             </a:fld>
             <a:endParaRPr lang="en-US" dirty="0"/>
           </a:p>
@@ -3563,6 +3568,13 @@
   <p:clrMapOvr>
     <a:masterClrMapping/>
   </p:clrMapOvr>
+  <p:timing>
+    <p:tnLst>
+      <p:par>
+        <p:cTn id="1" dur="indefinite" restart="never" nodeType="tmRoot"/>
+      </p:par>
+    </p:tnLst>
+  </p:timing>
 </p:sld>
 </file>
 
@@ -3619,8 +3631,8 @@
         </p:nvSpPr>
         <p:spPr>
           <a:xfrm>
-            <a:off x="386618" y="1415270"/>
-            <a:ext cx="7065060" cy="707886"/>
+            <a:off x="386617" y="1415270"/>
+            <a:ext cx="7414357" cy="707886"/>
           </a:xfrm>
           <a:prstGeom prst="rect">
             <a:avLst/>
@@ -3634,7 +3646,27 @@
           <a:p>
             <a:r>
               <a:rPr lang="en-US" sz="2000" dirty="0" smtClean="0"/>
-              <a:t>We can use the snippet below to hit Google’s API for each of our addresses, and get the coordinates we want.</a:t>
+              <a:t>We can use the snippet below to hit Google’s API for each of our addresses, and </a:t>
+            </a:r>
+            <a:r>
+              <a:rPr lang="en-US" sz="2000" dirty="0" smtClean="0"/>
+              <a:t>print out the </a:t>
+            </a:r>
+            <a:r>
+              <a:rPr lang="en-US" sz="2000" dirty="0" smtClean="0"/>
+              <a:t>coordinates </a:t>
+            </a:r>
+            <a:r>
+              <a:rPr lang="en-US" sz="2000" smtClean="0"/>
+              <a:t>we </a:t>
+            </a:r>
+            <a:r>
+              <a:rPr lang="en-US" sz="2000" smtClean="0"/>
+              <a:t>want</a:t>
+            </a:r>
+            <a:r>
+              <a:rPr lang="en-US" sz="2000"/>
+              <a:t>:</a:t>
             </a:r>
             <a:endParaRPr lang="en-US" sz="2000" dirty="0"/>
           </a:p>
@@ -3642,7 +3674,7 @@
       </p:sp>
       <p:pic>
         <p:nvPicPr>
-          <p:cNvPr id="4" name="Picture 3"/>
+          <p:cNvPr id="5" name="Picture 4"/>
           <p:cNvPicPr>
             <a:picLocks noChangeAspect="1"/>
           </p:cNvPicPr>
@@ -3662,8 +3694,8 @@
         </p:blipFill>
         <p:spPr>
           <a:xfrm>
-            <a:off x="479440" y="2476501"/>
-            <a:ext cx="10382250" cy="3476625"/>
+            <a:off x="458057" y="2390345"/>
+            <a:ext cx="9420225" cy="3676650"/>
           </a:xfrm>
           <a:prstGeom prst="rect">
             <a:avLst/>
@@ -3736,8 +3768,8 @@
         </p:nvSpPr>
         <p:spPr>
           <a:xfrm>
-            <a:off x="386618" y="1415271"/>
-            <a:ext cx="7024116" cy="707886"/>
+            <a:off x="386617" y="1415271"/>
+            <a:ext cx="7242907" cy="707886"/>
           </a:xfrm>
           <a:prstGeom prst="rect">
             <a:avLst/>
@@ -3751,7 +3783,31 @@
           <a:p>
             <a:r>
               <a:rPr lang="en-US" sz="2000" dirty="0" smtClean="0"/>
-              <a:t>That snippet looked familiar… let’s combine the geocoder with the KML generation</a:t>
+              <a:t>Say, that snippet </a:t>
+            </a:r>
+            <a:r>
+              <a:rPr lang="en-US" sz="2000" dirty="0" smtClean="0"/>
+              <a:t>looked </a:t>
+            </a:r>
+            <a:r>
+              <a:rPr lang="en-US" sz="2000" dirty="0" smtClean="0"/>
+              <a:t>kind of like the first one… </a:t>
+            </a:r>
+            <a:r>
+              <a:rPr lang="en-US" sz="2000" dirty="0" smtClean="0"/>
+              <a:t>let’s </a:t>
+            </a:r>
+            <a:r>
+              <a:rPr lang="en-US" sz="2000" dirty="0" smtClean="0"/>
+              <a:t>just combine </a:t>
+            </a:r>
+            <a:r>
+              <a:rPr lang="en-US" sz="2000" dirty="0" smtClean="0"/>
+              <a:t>the geocoder with the KML </a:t>
+            </a:r>
+            <a:r>
+              <a:rPr lang="en-US" sz="2000" dirty="0" smtClean="0"/>
+              <a:t>maker:</a:t>
             </a:r>
             <a:endParaRPr lang="en-US" sz="2000" dirty="0"/>
           </a:p>
@@ -3759,7 +3815,7 @@
       </p:sp>
       <p:pic>
         <p:nvPicPr>
-          <p:cNvPr id="4" name="Picture 3"/>
+          <p:cNvPr id="3" name="Picture 2"/>
           <p:cNvPicPr>
             <a:picLocks noChangeAspect="1"/>
           </p:cNvPicPr>
@@ -3779,8 +3835,8 @@
         </p:blipFill>
         <p:spPr>
           <a:xfrm>
-            <a:off x="488965" y="2434232"/>
-            <a:ext cx="10363200" cy="3790950"/>
+            <a:off x="443770" y="2363786"/>
+            <a:ext cx="9420225" cy="3962400"/>
           </a:xfrm>
           <a:prstGeom prst="rect">
             <a:avLst/>
@@ -3853,8 +3909,8 @@
         </p:nvSpPr>
         <p:spPr>
           <a:xfrm>
-            <a:off x="386619" y="2356967"/>
-            <a:ext cx="8102289" cy="892552"/>
+            <a:off x="386619" y="1528292"/>
+            <a:ext cx="3571019" cy="461665"/>
           </a:xfrm>
           <a:prstGeom prst="rect">
             <a:avLst/>
@@ -3868,18 +3924,41 @@
           <a:p>
             <a:r>
               <a:rPr lang="en-US" sz="2400" dirty="0" smtClean="0"/>
-              <a:t>Geocoding and programmatic mapping:</a:t>
-            </a:r>
-          </a:p>
-          <a:p>
-            <a:r>
-              <a:rPr lang="en-US" sz="2800" b="1" dirty="0" smtClean="0"/>
-              <a:t>nothing to be afraid of</a:t>
+              <a:t>Questions?</a:t>
             </a:r>
             <a:endParaRPr lang="en-US" sz="2800" b="1" dirty="0"/>
           </a:p>
         </p:txBody>
       </p:sp>
+      <p:pic>
+        <p:nvPicPr>
+          <p:cNvPr id="3" name="Picture 2"/>
+          <p:cNvPicPr>
+            <a:picLocks noChangeAspect="1"/>
+          </p:cNvPicPr>
+          <p:nvPr/>
+        </p:nvPicPr>
+        <p:blipFill rotWithShape="1">
+          <a:blip r:embed="rId2">
+            <a:extLst>
+              <a:ext uri="{28A0092B-C50C-407E-A947-70E740481C1C}">
+                <a14:useLocalDpi xmlns:a14="http://schemas.microsoft.com/office/drawing/2010/main" val="0"/>
+              </a:ext>
+            </a:extLst>
+          </a:blip>
+          <a:srcRect l="3753" t="10204" r="2259" b="16655"/>
+          <a:stretch/>
+        </p:blipFill>
+        <p:spPr>
+          <a:xfrm>
+            <a:off x="455626" y="2471741"/>
+            <a:ext cx="10372725" cy="3743325"/>
+          </a:xfrm>
+          <a:prstGeom prst="rect">
+            <a:avLst/>
+          </a:prstGeom>
+        </p:spPr>
+      </p:pic>
     </p:spTree>
     <p:extLst>
       <p:ext uri="{BB962C8B-B14F-4D97-AF65-F5344CB8AC3E}">
@@ -3934,20 +4013,35 @@
           <a:p>
             <a:r>
               <a:rPr lang="en-US" sz="2000" dirty="0" smtClean="0"/>
-              <a:t>KML is a structured textual markup language for spatial data</a:t>
-            </a:r>
-          </a:p>
-          <a:p>
-            <a:r>
-              <a:rPr lang="en-US" sz="2000" dirty="0" smtClean="0"/>
-              <a:t>An open standard promoted by Google</a:t>
-            </a:r>
-          </a:p>
-          <a:p>
-            <a:r>
-              <a:rPr lang="en-US" sz="2000" dirty="0" smtClean="0"/>
-              <a:t>Will look instantly familiar to anyone who’s seen HTML</a:t>
-            </a:r>
+              <a:t>KML is a structured textual markup language for spatial </a:t>
+            </a:r>
+            <a:r>
+              <a:rPr lang="en-US" sz="2000" dirty="0" smtClean="0"/>
+              <a:t>data.</a:t>
+            </a:r>
+            <a:endParaRPr lang="en-US" sz="2000" dirty="0" smtClean="0"/>
+          </a:p>
+          <a:p>
+            <a:r>
+              <a:rPr lang="en-US" sz="2000" dirty="0" smtClean="0"/>
+              <a:t>An open standard promoted by </a:t>
+            </a:r>
+            <a:r>
+              <a:rPr lang="en-US" sz="2000" dirty="0" smtClean="0"/>
+              <a:t>Google.</a:t>
+            </a:r>
+            <a:endParaRPr lang="en-US" sz="2000" dirty="0" smtClean="0"/>
+          </a:p>
+          <a:p>
+            <a:r>
+              <a:rPr lang="en-US" sz="2000" dirty="0" smtClean="0"/>
+              <a:t>Will look instantly familiar to anyone who’s seen </a:t>
+            </a:r>
+            <a:r>
+              <a:rPr lang="en-US" sz="2000" dirty="0" smtClean="0"/>
+              <a:t>HTML.</a:t>
+            </a:r>
+            <a:endParaRPr lang="en-US" sz="2000" dirty="0" smtClean="0"/>
           </a:p>
         </p:txBody>
       </p:sp>
@@ -3989,6 +4083,13 @@
   <p:clrMapOvr>
     <a:masterClrMapping/>
   </p:clrMapOvr>
+  <p:timing>
+    <p:tnLst>
+      <p:par>
+        <p:cTn id="1" dur="indefinite" restart="never" nodeType="tmRoot"/>
+      </p:par>
+    </p:tnLst>
+  </p:timing>
 </p:sld>
 </file>
 
@@ -4049,8 +4150,8 @@
         </p:nvSpPr>
         <p:spPr>
           <a:xfrm>
-            <a:off x="337190" y="2413814"/>
-            <a:ext cx="4827933" cy="2840573"/>
+            <a:off x="337189" y="2413814"/>
+            <a:ext cx="5116937" cy="2840573"/>
           </a:xfrm>
         </p:spPr>
         <p:txBody>
@@ -4061,20 +4162,42 @@
           <a:p>
             <a:r>
               <a:rPr lang="en-US" sz="2000" dirty="0" smtClean="0"/>
-              <a:t>KML files require a basic header and footer, just like HTML.</a:t>
-            </a:r>
-          </a:p>
-          <a:p>
-            <a:r>
-              <a:rPr lang="en-US" sz="2000" dirty="0" smtClean="0"/>
-              <a:t>There’s plenty of room for complexity and customization, but you can make a valid KML file using only two lines.</a:t>
-            </a:r>
-          </a:p>
-          <a:p>
-            <a:r>
-              <a:rPr lang="en-US" sz="2000" dirty="0" smtClean="0"/>
-              <a:t>The header simply references the KML specification, as is customary for XML text.</a:t>
-            </a:r>
+              <a:t>KML files require a </a:t>
+            </a:r>
+            <a:r>
+              <a:rPr lang="en-US" sz="2000" dirty="0" smtClean="0"/>
+              <a:t>standard header </a:t>
+            </a:r>
+            <a:r>
+              <a:rPr lang="en-US" sz="2000" dirty="0" smtClean="0"/>
+              <a:t>and footer, just like HTML</a:t>
+            </a:r>
+            <a:r>
+              <a:rPr lang="en-US" sz="2000" dirty="0" smtClean="0"/>
+              <a:t>.</a:t>
+            </a:r>
+          </a:p>
+          <a:p>
+            <a:r>
+              <a:rPr lang="en-US" sz="2000" dirty="0"/>
+              <a:t>The header simply references the KML specification, as is customary for XML text</a:t>
+            </a:r>
+            <a:r>
+              <a:rPr lang="en-US" sz="2000" dirty="0" smtClean="0"/>
+              <a:t>.</a:t>
+            </a:r>
+            <a:endParaRPr lang="en-US" sz="2000" dirty="0" smtClean="0"/>
+          </a:p>
+          <a:p>
+            <a:r>
+              <a:rPr lang="en-US" sz="2000" dirty="0" smtClean="0"/>
+              <a:t>There’s plenty of room for complexity and customization, but you can make a valid KML file using </a:t>
+            </a:r>
+            <a:r>
+              <a:rPr lang="en-US" sz="2000" dirty="0" smtClean="0"/>
+              <a:t>just these lines.</a:t>
+            </a:r>
+            <a:endParaRPr lang="en-US" sz="2000" dirty="0" smtClean="0"/>
           </a:p>
         </p:txBody>
       </p:sp>
@@ -4090,13 +4213,13 @@
         </p:nvSpPr>
         <p:spPr>
           <a:xfrm>
-            <a:off x="5693410" y="2553245"/>
-            <a:ext cx="5577800" cy="2458994"/>
+            <a:off x="5865538" y="2413386"/>
+            <a:ext cx="5261102" cy="3696949"/>
           </a:xfrm>
         </p:spPr>
         <p:txBody>
           <a:bodyPr>
-            <a:normAutofit lnSpcReduction="10000"/>
+            <a:normAutofit/>
           </a:bodyPr>
           <a:lstStyle/>
           <a:p>
@@ -4108,52 +4231,11 @@
             </a:pPr>
             <a:r>
               <a:rPr lang="en-US" dirty="0"/>
-              <a:t>&lt;?xml version="1.0" encoding="UTF-8"?&gt;</a:t>
-            </a:r>
-            <a:br>
-              <a:rPr lang="en-US" dirty="0"/>
-            </a:br>
-            <a:r>
-              <a:rPr lang="en-US" dirty="0"/>
-              <a:t>&lt;</a:t>
-            </a:r>
-            <a:r>
-              <a:rPr lang="en-US" dirty="0" err="1"/>
-              <a:t>kml</a:t>
-            </a:r>
-            <a:r>
-              <a:rPr lang="en-US" dirty="0"/>
-              <a:t> </a:t>
-            </a:r>
-            <a:r>
-              <a:rPr lang="en-US" dirty="0" err="1" smtClean="0"/>
-              <a:t>xmlns</a:t>
+              <a:t>&lt;?xml version="1.0" encoding="UTF-8</a:t>
             </a:r>
             <a:r>
               <a:rPr lang="en-US" dirty="0" smtClean="0"/>
-              <a:t>=</a:t>
-            </a:r>
-            <a:r>
-              <a:rPr lang="en-US" dirty="0" smtClean="0">
-                <a:hlinkClick r:id="rId2"/>
-              </a:rPr>
-              <a:t>http</a:t>
-            </a:r>
-            <a:r>
-              <a:rPr lang="en-US" dirty="0">
-                <a:hlinkClick r:id="rId2"/>
-              </a:rPr>
-              <a:t>://</a:t>
-            </a:r>
-            <a:r>
-              <a:rPr lang="en-US" dirty="0" smtClean="0">
-                <a:hlinkClick r:id="rId2"/>
-              </a:rPr>
-              <a:t>www.opengis.net/kml/2.2</a:t>
-            </a:r>
-            <a:r>
-              <a:rPr lang="en-US" dirty="0" smtClean="0"/>
-              <a:t>&gt;</a:t>
+              <a:t>"?&gt;</a:t>
             </a:r>
           </a:p>
           <a:p>
@@ -4163,7 +4245,46 @@
               </a:spcBef>
               <a:buNone/>
             </a:pPr>
-            <a:endParaRPr lang="en-US" dirty="0" smtClean="0"/>
+            <a:r>
+              <a:rPr lang="en-US" dirty="0" smtClean="0"/>
+              <a:t>&lt;</a:t>
+            </a:r>
+            <a:r>
+              <a:rPr lang="en-US" dirty="0" err="1"/>
+              <a:t>kml</a:t>
+            </a:r>
+            <a:r>
+              <a:rPr lang="en-US" dirty="0"/>
+              <a:t> </a:t>
+            </a:r>
+            <a:r>
+              <a:rPr lang="en-US" dirty="0" err="1"/>
+              <a:t>xmlns</a:t>
+            </a:r>
+            <a:r>
+              <a:rPr lang="en-US" dirty="0"/>
+              <a:t>="http://</a:t>
+            </a:r>
+            <a:r>
+              <a:rPr lang="en-US" dirty="0" err="1"/>
+              <a:t>www.opengis.net</a:t>
+            </a:r>
+            <a:r>
+              <a:rPr lang="en-US" dirty="0"/>
+              <a:t>/</a:t>
+            </a:r>
+            <a:r>
+              <a:rPr lang="en-US" dirty="0" err="1"/>
+              <a:t>kml</a:t>
+            </a:r>
+            <a:r>
+              <a:rPr lang="en-US" dirty="0"/>
+              <a:t>/2.2</a:t>
+            </a:r>
+            <a:r>
+              <a:rPr lang="en-US" dirty="0" smtClean="0"/>
+              <a:t>"&gt;</a:t>
+            </a:r>
           </a:p>
           <a:p>
             <a:pPr marL="0" indent="0">
@@ -4172,6 +4293,10 @@
               </a:spcBef>
               <a:buNone/>
             </a:pPr>
+            <a:r>
+              <a:rPr lang="en-US" dirty="0" smtClean="0"/>
+              <a:t>&lt;Document&gt;</a:t>
+            </a:r>
             <a:endParaRPr lang="en-US" dirty="0" smtClean="0"/>
           </a:p>
           <a:p>
@@ -4181,10 +4306,6 @@
               </a:spcBef>
               <a:buNone/>
             </a:pPr>
-            <a:r>
-              <a:rPr lang="en-US" dirty="0" smtClean="0"/>
-              <a:t>    *body goes here*</a:t>
-            </a:r>
             <a:endParaRPr lang="en-US" dirty="0"/>
           </a:p>
           <a:p>
@@ -4204,24 +4325,51 @@
               <a:buNone/>
             </a:pPr>
             <a:r>
+              <a:rPr lang="en-US" dirty="0" smtClean="0">
+                <a:solidFill>
+                  <a:schemeClr val="bg1">
+                    <a:lumMod val="65000"/>
+                  </a:schemeClr>
+                </a:solidFill>
+              </a:rPr>
+              <a:t>    *body goes here*</a:t>
+            </a:r>
+            <a:endParaRPr lang="en-US" dirty="0">
+              <a:solidFill>
+                <a:schemeClr val="bg1">
+                  <a:lumMod val="65000"/>
+                </a:schemeClr>
+              </a:solidFill>
+            </a:endParaRPr>
+          </a:p>
+          <a:p>
+            <a:pPr marL="0" indent="0">
+              <a:spcBef>
+                <a:spcPts val="0"/>
+              </a:spcBef>
+              <a:buNone/>
+            </a:pPr>
+            <a:r>
               <a:rPr lang="en-US" dirty="0"/>
               <a:t/>
             </a:r>
             <a:br>
               <a:rPr lang="en-US" dirty="0"/>
             </a:br>
-            <a:r>
-              <a:rPr lang="en-US" dirty="0"/>
-              <a:t>&lt;/</a:t>
-            </a:r>
-            <a:r>
-              <a:rPr lang="en-US" dirty="0" err="1"/>
-              <a:t>Placemark</a:t>
-            </a:r>
+            <a:endParaRPr lang="en-US" dirty="0" smtClean="0"/>
+          </a:p>
+          <a:p>
+            <a:pPr marL="0" indent="0">
+              <a:spcBef>
+                <a:spcPts val="0"/>
+              </a:spcBef>
+              <a:buNone/>
+            </a:pPr>
             <a:r>
               <a:rPr lang="en-US" dirty="0" smtClean="0"/>
-              <a:t>&gt;</a:t>
-            </a:r>
+              <a:t>&lt;/Document&gt;</a:t>
+            </a:r>
+            <a:endParaRPr lang="en-US" dirty="0" smtClean="0"/>
           </a:p>
           <a:p>
             <a:pPr marL="0" indent="0">
@@ -4255,6 +4403,13 @@
   <p:clrMapOvr>
     <a:masterClrMapping/>
   </p:clrMapOvr>
+  <p:timing>
+    <p:tnLst>
+      <p:par>
+        <p:cTn id="1" dur="indefinite" restart="never" nodeType="tmRoot"/>
+      </p:par>
+    </p:tnLst>
+  </p:timing>
 </p:sld>
 </file>
 
@@ -4315,13 +4470,13 @@
         </p:nvSpPr>
         <p:spPr>
           <a:xfrm>
-            <a:off x="372971" y="1824467"/>
-            <a:ext cx="5304498" cy="4361935"/>
+            <a:off x="304550" y="1416581"/>
+            <a:ext cx="5827804" cy="5055231"/>
           </a:xfrm>
         </p:spPr>
         <p:txBody>
           <a:bodyPr>
-            <a:normAutofit fontScale="92500" lnSpcReduction="10000"/>
+            <a:noAutofit/>
           </a:bodyPr>
           <a:lstStyle/>
           <a:p>
@@ -4372,7 +4527,15 @@
           <a:p>
             <a:r>
               <a:rPr lang="en-US" dirty="0" smtClean="0"/>
-              <a:t>Descriptions can contain HTML for extra pizazz, features can be animated, they can have special styles, and so on. </a:t>
+              <a:t>Descriptions can contain HTML for extra pizazz, features can be animated, they can have special styles, </a:t>
+            </a:r>
+            <a:r>
+              <a:rPr lang="en-US" dirty="0" smtClean="0"/>
+              <a:t>they can stream from a network, they can only show up at different zoom levels, and so on and so </a:t>
+            </a:r>
+            <a:r>
+              <a:rPr lang="en-US" dirty="0" smtClean="0"/>
+              <a:t>on. </a:t>
             </a:r>
             <a:r>
               <a:rPr lang="en-US" dirty="0"/>
@@ -4397,13 +4560,13 @@
         </p:nvSpPr>
         <p:spPr>
           <a:xfrm>
-            <a:off x="6050285" y="1367547"/>
-            <a:ext cx="5222766" cy="5306212"/>
+            <a:off x="6250312" y="1132579"/>
+            <a:ext cx="5036815" cy="5565721"/>
           </a:xfrm>
         </p:spPr>
         <p:txBody>
           <a:bodyPr>
-            <a:normAutofit fontScale="92500" lnSpcReduction="10000"/>
+            <a:normAutofit fontScale="92500" lnSpcReduction="20000"/>
           </a:bodyPr>
           <a:lstStyle/>
           <a:p>
@@ -4421,9 +4584,67 @@
                   </a:schemeClr>
                 </a:solidFill>
               </a:rPr>
-              <a:t>&lt;?xml version="1.0" encoding="UTF-8"?&gt;</a:t>
-            </a:r>
-            <a:br>
+              <a:t>&lt;?xml version="1.0" encoding="UTF-8</a:t>
+            </a:r>
+            <a:r>
+              <a:rPr lang="en-US" dirty="0" smtClean="0">
+                <a:solidFill>
+                  <a:schemeClr val="bg1">
+                    <a:lumMod val="65000"/>
+                  </a:schemeClr>
+                </a:solidFill>
+              </a:rPr>
+              <a:t>"?&gt;</a:t>
+            </a:r>
+          </a:p>
+          <a:p>
+            <a:pPr marL="0" indent="0">
+              <a:spcBef>
+                <a:spcPts val="0"/>
+              </a:spcBef>
+              <a:buNone/>
+            </a:pPr>
+            <a:r>
+              <a:rPr lang="en-US" dirty="0" smtClean="0">
+                <a:solidFill>
+                  <a:schemeClr val="bg1">
+                    <a:lumMod val="65000"/>
+                  </a:schemeClr>
+                </a:solidFill>
+              </a:rPr>
+              <a:t>&lt;</a:t>
+            </a:r>
+            <a:r>
+              <a:rPr lang="en-US" dirty="0" err="1" smtClean="0">
+                <a:solidFill>
+                  <a:schemeClr val="bg1">
+                    <a:lumMod val="65000"/>
+                  </a:schemeClr>
+                </a:solidFill>
+              </a:rPr>
+              <a:t>kml</a:t>
+            </a:r>
+            <a:r>
+              <a:rPr lang="en-US" dirty="0" smtClean="0">
+                <a:solidFill>
+                  <a:schemeClr val="bg1">
+                    <a:lumMod val="65000"/>
+                  </a:schemeClr>
+                </a:solidFill>
+              </a:rPr>
+              <a:t> </a:t>
+            </a:r>
+            <a:r>
+              <a:rPr lang="en-US" dirty="0" err="1" smtClean="0">
+                <a:solidFill>
+                  <a:schemeClr val="bg1">
+                    <a:lumMod val="65000"/>
+                  </a:schemeClr>
+                </a:solidFill>
+              </a:rPr>
+              <a:t>xmlns</a:t>
+            </a:r>
+            <a:r>
               <a:rPr lang="en-US" dirty="0">
                 <a:solidFill>
                   <a:schemeClr val="bg1">
@@ -4431,7 +4652,18 @@
                   </a:schemeClr>
                 </a:solidFill>
               </a:rPr>
-            </a:br>
+              <a:t>="http://</a:t>
+            </a:r>
+            <a:r>
+              <a:rPr lang="en-US" dirty="0" err="1">
+                <a:solidFill>
+                  <a:schemeClr val="bg1">
+                    <a:lumMod val="65000"/>
+                  </a:schemeClr>
+                </a:solidFill>
+              </a:rPr>
+              <a:t>www.opengis.net</a:t>
+            </a:r>
             <a:r>
               <a:rPr lang="en-US" dirty="0">
                 <a:solidFill>
@@ -4440,7 +4672,7 @@
                   </a:schemeClr>
                 </a:solidFill>
               </a:rPr>
-              <a:t>&lt;</a:t>
+              <a:t>/</a:t>
             </a:r>
             <a:r>
               <a:rPr lang="en-US" dirty="0" err="1">
@@ -4460,17 +4692,7 @@
                   </a:schemeClr>
                 </a:solidFill>
               </a:rPr>
-              <a:t> </a:t>
-            </a:r>
-            <a:r>
-              <a:rPr lang="en-US" dirty="0" err="1" smtClean="0">
-                <a:solidFill>
-                  <a:schemeClr val="bg1">
-                    <a:lumMod val="65000"/>
-                  </a:schemeClr>
-                </a:solidFill>
-              </a:rPr>
-              <a:t>xmlns</a:t>
+              <a:t>/2.2</a:t>
             </a:r>
             <a:r>
               <a:rPr lang="en-US" dirty="0" smtClean="0">
@@ -4480,41 +4702,16 @@
                   </a:schemeClr>
                 </a:solidFill>
               </a:rPr>
-              <a:t>=</a:t>
-            </a:r>
-            <a:r>
-              <a:rPr lang="en-US" dirty="0" smtClean="0">
-                <a:solidFill>
-                  <a:schemeClr val="bg1">
-                    <a:lumMod val="65000"/>
-                  </a:schemeClr>
-                </a:solidFill>
-                <a:hlinkClick r:id="rId2"/>
-              </a:rPr>
-              <a:t>http</a:t>
-            </a:r>
-            <a:r>
-              <a:rPr lang="en-US" dirty="0">
-                <a:solidFill>
-                  <a:schemeClr val="bg1">
-                    <a:lumMod val="65000"/>
-                  </a:schemeClr>
-                </a:solidFill>
-                <a:hlinkClick r:id="rId2"/>
-              </a:rPr>
-              <a:t>://</a:t>
-            </a:r>
-            <a:r>
-              <a:rPr lang="en-US" dirty="0" smtClean="0">
-                <a:solidFill>
-                  <a:schemeClr val="bg1">
-                    <a:lumMod val="65000"/>
-                  </a:schemeClr>
-                </a:solidFill>
-                <a:hlinkClick r:id="rId2"/>
-              </a:rPr>
-              <a:t>www.opengis.net/kml/2.2</a:t>
-            </a:r>
+              <a:t>"&gt;</a:t>
+            </a:r>
+          </a:p>
+          <a:p>
+            <a:pPr marL="0" indent="0">
+              <a:spcBef>
+                <a:spcPts val="0"/>
+              </a:spcBef>
+              <a:buNone/>
+            </a:pPr>
             <a:r>
               <a:rPr lang="en-US" dirty="0" smtClean="0">
                 <a:solidFill>
@@ -4523,7 +4720,7 @@
                   </a:schemeClr>
                 </a:solidFill>
               </a:rPr>
-              <a:t>&gt;</a:t>
+              <a:t>&lt;Document&gt;</a:t>
             </a:r>
           </a:p>
           <a:p>
@@ -4533,7 +4730,13 @@
               </a:spcBef>
               <a:buNone/>
             </a:pPr>
-            <a:endParaRPr lang="en-US" dirty="0" smtClean="0"/>
+            <a:endParaRPr lang="en-US" dirty="0" smtClean="0">
+              <a:solidFill>
+                <a:schemeClr val="bg1">
+                  <a:lumMod val="65000"/>
+                </a:schemeClr>
+              </a:solidFill>
+            </a:endParaRPr>
           </a:p>
           <a:p>
             <a:pPr marL="0" indent="0">
@@ -4551,15 +4754,8 @@
               <a:t>Placemark</a:t>
             </a:r>
             <a:r>
-              <a:rPr lang="en-US" dirty="0"/>
+              <a:rPr lang="en-US" dirty="0" smtClean="0"/>
               <a:t>&gt;</a:t>
-            </a:r>
-            <a:br>
-              <a:rPr lang="en-US" dirty="0"/>
-            </a:br>
-            <a:r>
-              <a:rPr lang="en-US" dirty="0" smtClean="0"/>
-              <a:t>    &lt;name&gt;</a:t>
             </a:r>
           </a:p>
           <a:p>
@@ -4569,14 +4765,6 @@
               </a:spcBef>
               <a:buNone/>
             </a:pPr>
-            <a:r>
-              <a:rPr lang="en-US" dirty="0" smtClean="0"/>
-              <a:t>        Simple </a:t>
-            </a:r>
-            <a:r>
-              <a:rPr lang="en-US" dirty="0" err="1" smtClean="0"/>
-              <a:t>placemark</a:t>
-            </a:r>
             <a:endParaRPr lang="en-US" dirty="0" smtClean="0"/>
           </a:p>
           <a:p>
@@ -4588,11 +4776,11 @@
             </a:pPr>
             <a:r>
               <a:rPr lang="en-US" dirty="0" smtClean="0"/>
-              <a:t>    &lt;/</a:t>
+              <a:t>    </a:t>
             </a:r>
             <a:r>
               <a:rPr lang="en-US" dirty="0"/>
-              <a:t>name</a:t>
+              <a:t>&lt;name</a:t>
             </a:r>
             <a:r>
               <a:rPr lang="en-US" dirty="0" smtClean="0"/>
@@ -4607,24 +4795,18 @@
               <a:buNone/>
             </a:pPr>
             <a:r>
+              <a:rPr lang="en-US" dirty="0" smtClean="0"/>
+              <a:t>        </a:t>
+            </a:r>
+            <a:r>
               <a:rPr lang="en-US" dirty="0"/>
-              <a:t/>
-            </a:r>
-            <a:br>
-              <a:rPr lang="en-US" dirty="0"/>
-            </a:br>
-            <a:r>
-              <a:rPr lang="en-US" dirty="0" smtClean="0"/>
-              <a:t>    &lt;</a:t>
-            </a:r>
-            <a:r>
-              <a:rPr lang="en-US" dirty="0"/>
-              <a:t>description</a:t>
-            </a:r>
-            <a:r>
-              <a:rPr lang="en-US" dirty="0" smtClean="0"/>
-              <a:t>&gt;</a:t>
-            </a:r>
+              <a:t>Simple </a:t>
+            </a:r>
+            <a:r>
+              <a:rPr lang="en-US" dirty="0" err="1" smtClean="0"/>
+              <a:t>placemark</a:t>
+            </a:r>
+            <a:endParaRPr lang="en-US" dirty="0" smtClean="0"/>
           </a:p>
           <a:p>
             <a:pPr marL="0" indent="0">
@@ -4635,15 +4817,15 @@
             </a:pPr>
             <a:r>
               <a:rPr lang="en-US" dirty="0" smtClean="0"/>
-              <a:t>        A simple </a:t>
-            </a:r>
-            <a:r>
-              <a:rPr lang="en-US" dirty="0" err="1" smtClean="0"/>
-              <a:t>placemark</a:t>
+              <a:t>    </a:t>
+            </a:r>
+            <a:r>
+              <a:rPr lang="en-US" dirty="0"/>
+              <a:t>&lt;/name</a:t>
             </a:r>
             <a:r>
               <a:rPr lang="en-US" dirty="0" smtClean="0"/>
-              <a:t> description.</a:t>
+              <a:t>&gt;</a:t>
             </a:r>
           </a:p>
           <a:p>
@@ -4653,18 +4835,7 @@
               </a:spcBef>
               <a:buNone/>
             </a:pPr>
-            <a:r>
-              <a:rPr lang="en-US" dirty="0" smtClean="0"/>
-              <a:t>    &lt;/</a:t>
-            </a:r>
-            <a:r>
-              <a:rPr lang="en-US" dirty="0"/>
-              <a:t>description</a:t>
-            </a:r>
-            <a:r>
-              <a:rPr lang="en-US" dirty="0" smtClean="0"/>
-              <a:t>&gt;</a:t>
-            </a:r>
+            <a:endParaRPr lang="en-US" dirty="0" smtClean="0"/>
           </a:p>
           <a:p>
             <a:pPr marL="0" indent="0">
@@ -4674,26 +4845,16 @@
               <a:buNone/>
             </a:pPr>
             <a:r>
+              <a:rPr lang="en-US" dirty="0" smtClean="0"/>
+              <a:t>    </a:t>
+            </a:r>
+            <a:r>
               <a:rPr lang="en-US" dirty="0"/>
-              <a:t/>
-            </a:r>
-            <a:br>
-              <a:rPr lang="en-US" dirty="0"/>
-            </a:br>
+              <a:t>&lt;description</a:t>
+            </a:r>
             <a:r>
               <a:rPr lang="en-US" dirty="0" smtClean="0"/>
-              <a:t>    &lt;</a:t>
-            </a:r>
-            <a:r>
-              <a:rPr lang="en-US" dirty="0"/>
-              <a:t>Point&gt;</a:t>
-            </a:r>
-            <a:br>
-              <a:rPr lang="en-US" dirty="0"/>
-            </a:br>
-            <a:r>
-              <a:rPr lang="en-US" dirty="0" smtClean="0"/>
-              <a:t>        &lt;coordinates&gt;		-  </a:t>
+              <a:t>&gt;</a:t>
             </a:r>
           </a:p>
           <a:p>
@@ -4705,7 +4866,23 @@
             </a:pPr>
             <a:r>
               <a:rPr lang="en-US" dirty="0" smtClean="0"/>
-              <a:t>            122.082203,37.4222821,0</a:t>
+              <a:t>        </a:t>
+            </a:r>
+            <a:r>
+              <a:rPr lang="en-US" dirty="0"/>
+              <a:t>A simple </a:t>
+            </a:r>
+            <a:r>
+              <a:rPr lang="en-US" dirty="0" err="1"/>
+              <a:t>placemark</a:t>
+            </a:r>
+            <a:r>
+              <a:rPr lang="en-US" dirty="0"/>
+              <a:t> description</a:t>
+            </a:r>
+            <a:r>
+              <a:rPr lang="en-US" dirty="0" smtClean="0"/>
+              <a:t>.</a:t>
             </a:r>
           </a:p>
           <a:p>
@@ -4717,22 +4894,11 @@
             </a:pPr>
             <a:r>
               <a:rPr lang="en-US" dirty="0" smtClean="0"/>
-              <a:t>        &lt;/</a:t>
+              <a:t>    </a:t>
             </a:r>
             <a:r>
               <a:rPr lang="en-US" dirty="0"/>
-              <a:t>coordinates&gt;</a:t>
-            </a:r>
-            <a:br>
-              <a:rPr lang="en-US" dirty="0"/>
-            </a:br>
-            <a:r>
-              <a:rPr lang="en-US" dirty="0" smtClean="0"/>
-              <a:t>     &lt;/</a:t>
-            </a:r>
-            <a:r>
-              <a:rPr lang="en-US" dirty="0"/>
-              <a:t>Point</a:t>
+              <a:t>&lt;/description</a:t>
             </a:r>
             <a:r>
               <a:rPr lang="en-US" dirty="0" smtClean="0"/>
@@ -4746,33 +4912,153 @@
               </a:spcBef>
               <a:buNone/>
             </a:pPr>
+            <a:endParaRPr lang="en-US" dirty="0" smtClean="0"/>
+          </a:p>
+          <a:p>
+            <a:pPr marL="0" indent="0">
+              <a:spcBef>
+                <a:spcPts val="0"/>
+              </a:spcBef>
+              <a:buNone/>
+            </a:pPr>
+            <a:r>
+              <a:rPr lang="en-US" dirty="0" smtClean="0"/>
+              <a:t>    </a:t>
+            </a:r>
             <a:r>
               <a:rPr lang="en-US" dirty="0"/>
-              <a:t/>
-            </a:r>
-            <a:br>
+              <a:t>&lt;Point</a:t>
+            </a:r>
+            <a:r>
+              <a:rPr lang="en-US" dirty="0" smtClean="0"/>
+              <a:t>&gt;</a:t>
+            </a:r>
+          </a:p>
+          <a:p>
+            <a:pPr marL="0" indent="0">
+              <a:spcBef>
+                <a:spcPts val="0"/>
+              </a:spcBef>
+              <a:buNone/>
+            </a:pPr>
+            <a:r>
+              <a:rPr lang="en-US" dirty="0" smtClean="0"/>
+              <a:t>        </a:t>
+            </a:r>
+            <a:r>
               <a:rPr lang="en-US" dirty="0"/>
-            </a:br>
-            <a:r>
-              <a:rPr lang="en-US" dirty="0">
-                <a:solidFill>
-                  <a:schemeClr val="bg1">
-                    <a:lumMod val="65000"/>
-                  </a:schemeClr>
-                </a:solidFill>
-              </a:rPr>
+              <a:t>&lt;coordinates</a:t>
+            </a:r>
+            <a:r>
+              <a:rPr lang="en-US" dirty="0" smtClean="0"/>
+              <a:t>&gt;</a:t>
+            </a:r>
+          </a:p>
+          <a:p>
+            <a:pPr marL="0" indent="0">
+              <a:spcBef>
+                <a:spcPts val="0"/>
+              </a:spcBef>
+              <a:buNone/>
+            </a:pPr>
+            <a:r>
+              <a:rPr lang="en-US" dirty="0" smtClean="0"/>
+              <a:t>            </a:t>
+            </a:r>
+            <a:r>
+              <a:rPr lang="en-US" dirty="0"/>
+              <a:t>-</a:t>
+            </a:r>
+            <a:r>
+              <a:rPr lang="en-US" dirty="0" smtClean="0"/>
+              <a:t>77.03394,38.90485,0</a:t>
+            </a:r>
+          </a:p>
+          <a:p>
+            <a:pPr marL="0" indent="0">
+              <a:spcBef>
+                <a:spcPts val="0"/>
+              </a:spcBef>
+              <a:buNone/>
+            </a:pPr>
+            <a:r>
+              <a:rPr lang="en-US" dirty="0" smtClean="0"/>
+              <a:t>        </a:t>
+            </a:r>
+            <a:r>
+              <a:rPr lang="en-US" dirty="0"/>
+              <a:t>&lt;/coordinates</a:t>
+            </a:r>
+            <a:r>
+              <a:rPr lang="en-US" dirty="0" smtClean="0"/>
+              <a:t>&gt;</a:t>
+            </a:r>
+          </a:p>
+          <a:p>
+            <a:pPr marL="0" indent="0">
+              <a:spcBef>
+                <a:spcPts val="0"/>
+              </a:spcBef>
+              <a:buNone/>
+            </a:pPr>
+            <a:r>
+              <a:rPr lang="en-US" dirty="0" smtClean="0"/>
+              <a:t>     </a:t>
+            </a:r>
+            <a:r>
+              <a:rPr lang="en-US" dirty="0"/>
+              <a:t>&lt;/Point</a:t>
+            </a:r>
+            <a:r>
+              <a:rPr lang="en-US" dirty="0" smtClean="0"/>
+              <a:t>&gt;</a:t>
+            </a:r>
+          </a:p>
+          <a:p>
+            <a:pPr marL="0" indent="0">
+              <a:spcBef>
+                <a:spcPts val="0"/>
+              </a:spcBef>
+              <a:buNone/>
+            </a:pPr>
+            <a:endParaRPr lang="en-US" dirty="0" smtClean="0"/>
+          </a:p>
+          <a:p>
+            <a:pPr marL="0" indent="0">
+              <a:spcBef>
+                <a:spcPts val="0"/>
+              </a:spcBef>
+              <a:buNone/>
+            </a:pPr>
+            <a:r>
+              <a:rPr lang="en-US" dirty="0" smtClean="0"/>
               <a:t>&lt;/</a:t>
             </a:r>
             <a:r>
-              <a:rPr lang="en-US" dirty="0" err="1">
-                <a:solidFill>
-                  <a:schemeClr val="bg1">
-                    <a:lumMod val="65000"/>
-                  </a:schemeClr>
-                </a:solidFill>
-              </a:rPr>
+              <a:rPr lang="en-US" dirty="0" err="1"/>
               <a:t>Placemark</a:t>
             </a:r>
+            <a:r>
+              <a:rPr lang="en-US" dirty="0" smtClean="0"/>
+              <a:t>&gt;</a:t>
+            </a:r>
+          </a:p>
+          <a:p>
+            <a:pPr marL="0" indent="0">
+              <a:spcBef>
+                <a:spcPts val="0"/>
+              </a:spcBef>
+              <a:buNone/>
+            </a:pPr>
+            <a:endParaRPr lang="en-US" dirty="0" smtClean="0"/>
+          </a:p>
+          <a:p>
+            <a:pPr marL="0" indent="0">
+              <a:spcBef>
+                <a:spcPts val="0"/>
+              </a:spcBef>
+              <a:buNone/>
+            </a:pPr>
             <a:r>
               <a:rPr lang="en-US" dirty="0" smtClean="0">
                 <a:solidFill>
@@ -4781,7 +5067,7 @@
                   </a:schemeClr>
                 </a:solidFill>
               </a:rPr>
-              <a:t>&gt;</a:t>
+              <a:t>&lt;/Document&gt;</a:t>
             </a:r>
           </a:p>
           <a:p>
@@ -4821,6 +5107,13 @@
               </a:rPr>
               <a:t>&gt;</a:t>
             </a:r>
+            <a:endParaRPr lang="en-US" dirty="0">
+              <a:solidFill>
+                <a:schemeClr val="bg1">
+                  <a:lumMod val="65000"/>
+                </a:schemeClr>
+              </a:solidFill>
+            </a:endParaRPr>
           </a:p>
         </p:txBody>
       </p:sp>
@@ -4834,6 +5127,13 @@
   <p:clrMapOvr>
     <a:masterClrMapping/>
   </p:clrMapOvr>
+  <p:timing>
+    <p:tnLst>
+      <p:par>
+        <p:cTn id="1" dur="indefinite" restart="never" nodeType="tmRoot"/>
+      </p:par>
+    </p:tnLst>
+  </p:timing>
 </p:sld>
 </file>
 
@@ -4895,7 +5195,7 @@
         <p:spPr>
           <a:xfrm>
             <a:off x="337191" y="2067355"/>
-            <a:ext cx="5664074" cy="3583460"/>
+            <a:ext cx="5127694" cy="3583460"/>
           </a:xfrm>
         </p:spPr>
         <p:txBody>
@@ -4906,7 +5206,15 @@
           <a:p>
             <a:r>
               <a:rPr lang="en-US" sz="2000" dirty="0" smtClean="0"/>
-              <a:t>If we had a list of items with coordinates, such as this list of WDI locations, it would be very simple to write some ruby to generate the KML.</a:t>
+              <a:t>If we had a list of items with coordinates, such as this list of WDI locations, it would be very simple to write some </a:t>
+            </a:r>
+            <a:r>
+              <a:rPr lang="en-US" sz="2000" dirty="0" smtClean="0"/>
+              <a:t>Ruby </a:t>
+            </a:r>
+            <a:r>
+              <a:rPr lang="en-US" sz="2000" dirty="0" smtClean="0"/>
+              <a:t>to generate the KML.</a:t>
             </a:r>
           </a:p>
           <a:p>
@@ -4931,8 +5239,8 @@
         </p:nvSpPr>
         <p:spPr>
           <a:xfrm>
-            <a:off x="6588120" y="3123101"/>
-            <a:ext cx="4589398" cy="1015663"/>
+            <a:off x="6013523" y="3123101"/>
+            <a:ext cx="4776718" cy="1015663"/>
           </a:xfrm>
           <a:prstGeom prst="rect">
             <a:avLst/>
@@ -4947,19 +5255,59 @@
           <a:p>
             <a:r>
               <a:rPr lang="en-US" sz="2000" dirty="0" smtClean="0"/>
-              <a:t>GA Wash DC		40.793	-73.989</a:t>
-            </a:r>
-          </a:p>
-          <a:p>
-            <a:r>
-              <a:rPr lang="en-US" sz="2000" dirty="0" smtClean="0"/>
-              <a:t>GA New York		41.891	-87.627</a:t>
-            </a:r>
-          </a:p>
-          <a:p>
-            <a:r>
-              <a:rPr lang="en-US" sz="2000" dirty="0" smtClean="0"/>
-              <a:t>GA Chicago		41.891	-87.627</a:t>
+              <a:t>GA </a:t>
+            </a:r>
+            <a:r>
+              <a:rPr lang="en-US" sz="2000" dirty="0" smtClean="0"/>
+              <a:t>Wash. </a:t>
+            </a:r>
+            <a:r>
+              <a:rPr lang="en-US" sz="2000" dirty="0" smtClean="0"/>
+              <a:t>DC		</a:t>
+            </a:r>
+            <a:r>
+              <a:rPr lang="en-US" sz="2000" dirty="0" smtClean="0"/>
+              <a:t>38.90485</a:t>
+            </a:r>
+            <a:r>
+              <a:rPr lang="en-US" sz="2000" dirty="0"/>
+              <a:t>,</a:t>
+            </a:r>
+            <a:r>
+              <a:rPr lang="en-US" sz="2000" dirty="0" smtClean="0"/>
+              <a:t>-77.03394</a:t>
+            </a:r>
+          </a:p>
+          <a:p>
+            <a:r>
+              <a:rPr lang="en-US" sz="2000" dirty="0" smtClean="0"/>
+              <a:t>GA </a:t>
+            </a:r>
+            <a:r>
+              <a:rPr lang="en-US" sz="2000" dirty="0" smtClean="0"/>
+              <a:t>New York		</a:t>
+            </a:r>
+            <a:r>
+              <a:rPr lang="en-US" sz="2000" dirty="0" smtClean="0"/>
+              <a:t>40.73930,-73.98942</a:t>
+            </a:r>
+          </a:p>
+          <a:p>
+            <a:r>
+              <a:rPr lang="en-US" sz="2000" dirty="0" smtClean="0"/>
+              <a:t>GA </a:t>
+            </a:r>
+            <a:r>
+              <a:rPr lang="en-US" sz="2000" dirty="0" smtClean="0"/>
+              <a:t>Chicago		</a:t>
+            </a:r>
+            <a:r>
+              <a:rPr lang="en-US" sz="2000" dirty="0" smtClean="0"/>
+              <a:t>41.89061,-</a:t>
+            </a:r>
+            <a:r>
+              <a:rPr lang="en-US" sz="2000" dirty="0"/>
+              <a:t>87.62688</a:t>
             </a:r>
             <a:endParaRPr lang="en-US" sz="2000" dirty="0"/>
           </a:p>
@@ -4975,6 +5323,13 @@
   <p:clrMapOvr>
     <a:masterClrMapping/>
   </p:clrMapOvr>
+  <p:timing>
+    <p:tnLst>
+      <p:par>
+        <p:cTn id="1" dur="indefinite" restart="never" nodeType="tmRoot"/>
+      </p:par>
+    </p:tnLst>
+  </p:timing>
 </p:sld>
 </file>
 
@@ -5050,7 +5405,15 @@
           <a:p>
             <a:r>
               <a:rPr lang="en-US" sz="2000" dirty="0" smtClean="0"/>
-              <a:t>This snippet will turn the 3 General </a:t>
+              <a:t>This snippet will </a:t>
+            </a:r>
+            <a:r>
+              <a:rPr lang="en-US" sz="2000" dirty="0" smtClean="0"/>
+              <a:t>take the </a:t>
+            </a:r>
+            <a:r>
+              <a:rPr lang="en-US" sz="2000" dirty="0" smtClean="0"/>
+              <a:t>3 General </a:t>
             </a:r>
             <a:r>
               <a:rPr lang="en-US" sz="2000" dirty="0"/>
@@ -5058,7 +5421,15 @@
             </a:r>
             <a:r>
               <a:rPr lang="en-US" sz="2000" dirty="0" smtClean="0"/>
-              <a:t>ssembly location coordinates into a complete KML document:</a:t>
+              <a:t>ssembly location coordinates </a:t>
+            </a:r>
+            <a:r>
+              <a:rPr lang="en-US" sz="2000" dirty="0" smtClean="0"/>
+              <a:t>and print out a </a:t>
+            </a:r>
+            <a:r>
+              <a:rPr lang="en-US" sz="2000" dirty="0" smtClean="0"/>
+              <a:t>complete KML document:</a:t>
             </a:r>
             <a:endParaRPr lang="en-US" sz="2000" dirty="0"/>
           </a:p>
@@ -5066,13 +5437,13 @@
       </p:sp>
       <p:pic>
         <p:nvPicPr>
-          <p:cNvPr id="8" name="Picture 7"/>
+          <p:cNvPr id="5" name="Picture 4"/>
           <p:cNvPicPr>
             <a:picLocks noChangeAspect="1"/>
           </p:cNvPicPr>
           <p:nvPr/>
         </p:nvPicPr>
-        <p:blipFill rotWithShape="1">
+        <p:blipFill>
           <a:blip r:embed="rId2">
             <a:extLst>
               <a:ext uri="{28A0092B-C50C-407E-A947-70E740481C1C}">
@@ -5080,13 +5451,14 @@
               </a:ext>
             </a:extLst>
           </a:blip>
-          <a:srcRect r="1212"/>
-          <a:stretch/>
+          <a:stretch>
+            <a:fillRect/>
+          </a:stretch>
         </p:blipFill>
         <p:spPr>
           <a:xfrm>
-            <a:off x="523524" y="2533443"/>
-            <a:ext cx="10294082" cy="3467100"/>
+            <a:off x="442195" y="2396526"/>
+            <a:ext cx="9382125" cy="3829050"/>
           </a:xfrm>
           <a:prstGeom prst="rect">
             <a:avLst/>
@@ -5103,6 +5475,13 @@
   <p:clrMapOvr>
     <a:masterClrMapping/>
   </p:clrMapOvr>
+  <p:timing>
+    <p:tnLst>
+      <p:par>
+        <p:cTn id="1" dur="indefinite" restart="never" nodeType="tmRoot"/>
+      </p:par>
+    </p:tnLst>
+  </p:timing>
 </p:sld>
 </file>
 
@@ -5207,27 +5586,37 @@
           <a:p>
             <a:r>
               <a:rPr lang="en-US" sz="2000" dirty="0" smtClean="0"/>
-              <a:t>GA Wash DC	</a:t>
-            </a:r>
-            <a:r>
-              <a:rPr lang="en-US" sz="2000" dirty="0"/>
-              <a:t>	</a:t>
+              <a:t>GA </a:t>
+            </a:r>
+            <a:r>
+              <a:rPr lang="en-US" sz="2000" dirty="0" smtClean="0"/>
+              <a:t>Washington </a:t>
+            </a:r>
+            <a:r>
+              <a:rPr lang="en-US" sz="2000" dirty="0" smtClean="0"/>
+              <a:t>DC	</a:t>
+            </a:r>
+            <a:r>
+              <a:rPr lang="en-US" sz="2000" dirty="0" smtClean="0">
+                <a:solidFill>
+                  <a:srgbClr val="222222"/>
+                </a:solidFill>
+              </a:rPr>
+              <a:t>1133 </a:t>
             </a:r>
             <a:r>
               <a:rPr lang="en-US" sz="2000" dirty="0">
                 <a:solidFill>
                   <a:srgbClr val="222222"/>
                 </a:solidFill>
-                <a:latin typeface="Circular" charset="0"/>
               </a:rPr>
-              <a:t>1133 15th Street NW, 8th Floor </a:t>
+              <a:t>15th Street NW, 8th Floor </a:t>
             </a:r>
             <a:r>
               <a:rPr lang="en-US" sz="2000" dirty="0" smtClean="0">
                 <a:solidFill>
                   <a:srgbClr val="222222"/>
                 </a:solidFill>
-                <a:latin typeface="Circular" charset="0"/>
               </a:rPr>
               <a:t>Washington</a:t>
             </a:r>
@@ -5236,7 +5625,6 @@
                 <a:solidFill>
                   <a:srgbClr val="222222"/>
                 </a:solidFill>
-                <a:latin typeface="Circular" charset="0"/>
               </a:rPr>
               <a:t>, DC </a:t>
             </a:r>
@@ -5245,7 +5633,6 @@
                 <a:solidFill>
                   <a:srgbClr val="222222"/>
                 </a:solidFill>
-                <a:latin typeface="Circular" charset="0"/>
               </a:rPr>
               <a:t>20005</a:t>
             </a:r>
@@ -5262,7 +5649,15 @@
             </a:r>
             <a:r>
               <a:rPr lang="en-US" sz="2000" dirty="0"/>
-              <a:t>	902 Broadway, 4th </a:t>
+              <a:t>	</a:t>
+            </a:r>
+            <a:r>
+              <a:rPr lang="en-US" sz="2000" dirty="0" smtClean="0"/>
+              <a:t>	902 </a:t>
+            </a:r>
+            <a:r>
+              <a:rPr lang="en-US" sz="2000" dirty="0"/>
+              <a:t>Broadway, 4th </a:t>
             </a:r>
             <a:r>
               <a:rPr lang="en-US" sz="2000" dirty="0" smtClean="0"/>
@@ -5280,7 +5675,11 @@
           <a:p>
             <a:r>
               <a:rPr lang="en-US" sz="2000" dirty="0" smtClean="0"/>
-              <a:t>GA Chicago		444 </a:t>
+              <a:t>GA Chicago		</a:t>
+            </a:r>
+            <a:r>
+              <a:rPr lang="en-US" sz="2000" dirty="0" smtClean="0"/>
+              <a:t>	444 </a:t>
             </a:r>
             <a:r>
               <a:rPr lang="en-US" sz="2000" dirty="0"/>
@@ -5307,6 +5706,13 @@
   <p:clrMapOvr>
     <a:masterClrMapping/>
   </p:clrMapOvr>
+  <p:timing>
+    <p:tnLst>
+      <p:par>
+        <p:cTn id="1" dur="indefinite" restart="never" nodeType="tmRoot"/>
+      </p:par>
+    </p:tnLst>
+  </p:timing>
 </p:sld>
 </file>
 
@@ -5349,7 +5755,7 @@
           <a:p>
             <a:r>
               <a:rPr lang="en-US" dirty="0" smtClean="0"/>
-              <a:t>Geocoding</a:t>
+              <a:t>Geocoding, my friend!</a:t>
             </a:r>
             <a:endParaRPr lang="en-US" dirty="0"/>
           </a:p>
@@ -5385,7 +5791,15 @@
           <a:p>
             <a:r>
               <a:rPr lang="en-US" sz="2000" dirty="0" smtClean="0"/>
-              <a:t>Google provides an API for this.</a:t>
+              <a:t>Google provides </a:t>
+            </a:r>
+            <a:r>
+              <a:rPr lang="en-US" sz="2000" dirty="0" smtClean="0"/>
+              <a:t>a web </a:t>
+            </a:r>
+            <a:r>
+              <a:rPr lang="en-US" sz="2000" dirty="0" smtClean="0"/>
+              <a:t>API for this.</a:t>
             </a:r>
           </a:p>
         </p:txBody>
@@ -5400,6 +5814,13 @@
   <p:clrMapOvr>
     <a:masterClrMapping/>
   </p:clrMapOvr>
+  <p:timing>
+    <p:tnLst>
+      <p:par>
+        <p:cTn id="1" dur="indefinite" restart="never" nodeType="tmRoot"/>
+      </p:par>
+    </p:tnLst>
+  </p:timing>
 </p:sld>
 </file>
 
@@ -5475,7 +5896,15 @@
             </a:pPr>
             <a:r>
               <a:rPr lang="en-US" sz="2000" dirty="0" smtClean="0"/>
-              <a:t>If we add our address to the end of https://</a:t>
+              <a:t>If we add </a:t>
+            </a:r>
+            <a:r>
+              <a:rPr lang="en-US" sz="2000" dirty="0" smtClean="0"/>
+              <a:t>an address </a:t>
+            </a:r>
+            <a:r>
+              <a:rPr lang="en-US" sz="2000" dirty="0" smtClean="0"/>
+              <a:t>to the end of https://</a:t>
             </a:r>
             <a:r>
               <a:rPr lang="en-US" sz="2000" dirty="0" err="1" smtClean="0"/>
@@ -5584,11 +6013,27 @@
             </a:r>
             <a:r>
               <a:rPr lang="en-US" sz="2000" dirty="0"/>
-              <a:t>the coordinates are in the ["results"] ["geometry"]["location</a:t>
-            </a:r>
-            <a:r>
-              <a:rPr lang="en-US" sz="2000" dirty="0" smtClean="0"/>
-              <a:t>"] portion of the return.</a:t>
+              <a:t>the coordinates are in the </a:t>
+            </a:r>
+            <a:r>
+              <a:rPr lang="en-US" sz="2000" dirty="0">
+                <a:solidFill>
+                  <a:srgbClr val="0070C0"/>
+                </a:solidFill>
+              </a:rPr>
+              <a:t>["results"] ["geometry"]["location</a:t>
+            </a:r>
+            <a:r>
+              <a:rPr lang="en-US" sz="2000" dirty="0" smtClean="0">
+                <a:solidFill>
+                  <a:srgbClr val="0070C0"/>
+                </a:solidFill>
+              </a:rPr>
+              <a:t>"] </a:t>
+            </a:r>
+            <a:r>
+              <a:rPr lang="en-US" sz="2000" dirty="0" smtClean="0"/>
+              <a:t>portion of the return.</a:t>
             </a:r>
           </a:p>
         </p:txBody>

</xml_diff>